<commit_message>
Update Airbnb NYC Analysis Presentation Deck.pptx
</commit_message>
<xml_diff>
--- a/Airbnb NYC Analysis Presentation Deck.pptx
+++ b/Airbnb NYC Analysis Presentation Deck.pptx
@@ -5,7 +5,7 @@
     <p:sldMasterId id="2147483648" r:id="rId1"/>
   </p:sldMasterIdLst>
   <p:notesMasterIdLst>
-    <p:notesMasterId r:id="rId15"/>
+    <p:notesMasterId r:id="rId17"/>
   </p:notesMasterIdLst>
   <p:sldIdLst>
     <p:sldId id="257" r:id="rId2"/>
@@ -17,10 +17,12 @@
     <p:sldId id="271" r:id="rId8"/>
     <p:sldId id="270" r:id="rId9"/>
     <p:sldId id="273" r:id="rId10"/>
-    <p:sldId id="275" r:id="rId11"/>
-    <p:sldId id="264" r:id="rId12"/>
-    <p:sldId id="261" r:id="rId13"/>
-    <p:sldId id="274" r:id="rId14"/>
+    <p:sldId id="264" r:id="rId11"/>
+    <p:sldId id="277" r:id="rId12"/>
+    <p:sldId id="278" r:id="rId13"/>
+    <p:sldId id="261" r:id="rId14"/>
+    <p:sldId id="275" r:id="rId15"/>
+    <p:sldId id="274" r:id="rId16"/>
   </p:sldIdLst>
   <p:sldSz cx="12192000" cy="6858000"/>
   <p:notesSz cx="6858000" cy="9144000"/>
@@ -646,7 +648,7 @@
     </p:spTree>
     <p:extLst>
       <p:ext uri="{BB962C8B-B14F-4D97-AF65-F5344CB8AC3E}">
-        <p14:creationId xmlns:p14="http://schemas.microsoft.com/office/powerpoint/2010/main" val="3493068767"/>
+        <p14:creationId xmlns:p14="http://schemas.microsoft.com/office/powerpoint/2010/main" val="3373496410"/>
       </p:ext>
     </p:extLst>
   </p:cSld>
@@ -730,7 +732,7 @@
     </p:spTree>
     <p:extLst>
       <p:ext uri="{BB962C8B-B14F-4D97-AF65-F5344CB8AC3E}">
-        <p14:creationId xmlns:p14="http://schemas.microsoft.com/office/powerpoint/2010/main" val="2363009839"/>
+        <p14:creationId xmlns:p14="http://schemas.microsoft.com/office/powerpoint/2010/main" val="617814075"/>
       </p:ext>
     </p:extLst>
   </p:cSld>
@@ -806,6 +808,185 @@
             <a:fld id="{DF2352D6-35AF-0544-A99E-554CC41E76C4}" type="slidenum">
               <a:rPr lang="en-US" smtClean="0"/>
               <a:t>13</a:t>
+            </a:fld>
+            <a:endParaRPr lang="en-US"/>
+          </a:p>
+        </p:txBody>
+      </p:sp>
+    </p:spTree>
+    <p:extLst>
+      <p:ext uri="{BB962C8B-B14F-4D97-AF65-F5344CB8AC3E}">
+        <p14:creationId xmlns:p14="http://schemas.microsoft.com/office/powerpoint/2010/main" val="2363009839"/>
+      </p:ext>
+    </p:extLst>
+  </p:cSld>
+  <p:clrMapOvr>
+    <a:masterClrMapping/>
+  </p:clrMapOvr>
+</p:notes>
+</file>
+
+<file path=ppt/notesSlides/notesSlide13.xml><?xml version="1.0" encoding="utf-8"?>
+<p:notes xmlns:a="http://schemas.openxmlformats.org/drawingml/2006/main" xmlns:r="http://schemas.openxmlformats.org/officeDocument/2006/relationships" xmlns:p="http://schemas.openxmlformats.org/presentationml/2006/main">
+  <p:cSld>
+    <p:spTree>
+      <p:nvGrpSpPr>
+        <p:cNvPr id="1" name=""/>
+        <p:cNvGrpSpPr/>
+        <p:nvPr/>
+      </p:nvGrpSpPr>
+      <p:grpSpPr>
+        <a:xfrm>
+          <a:off x="0" y="0"/>
+          <a:ext cx="0" cy="0"/>
+          <a:chOff x="0" y="0"/>
+          <a:chExt cx="0" cy="0"/>
+        </a:xfrm>
+      </p:grpSpPr>
+      <p:sp>
+        <p:nvSpPr>
+          <p:cNvPr id="2" name="Slide Image Placeholder 1"/>
+          <p:cNvSpPr>
+            <a:spLocks noGrp="1" noRot="1" noChangeAspect="1"/>
+          </p:cNvSpPr>
+          <p:nvPr>
+            <p:ph type="sldImg"/>
+          </p:nvPr>
+        </p:nvSpPr>
+        <p:spPr/>
+      </p:sp>
+      <p:sp>
+        <p:nvSpPr>
+          <p:cNvPr id="3" name="Notes Placeholder 2"/>
+          <p:cNvSpPr>
+            <a:spLocks noGrp="1"/>
+          </p:cNvSpPr>
+          <p:nvPr>
+            <p:ph type="body" idx="1"/>
+          </p:nvPr>
+        </p:nvSpPr>
+        <p:spPr/>
+        <p:txBody>
+          <a:bodyPr/>
+          <a:lstStyle/>
+          <a:p>
+            <a:r>
+              <a:rPr lang="en-US" dirty="0"/>
+              <a:t>*** Provide details on Elephant </a:t>
+            </a:r>
+            <a:r>
+              <a:rPr lang="en-US" dirty="0" err="1"/>
+              <a:t>SQLscreenshots</a:t>
+            </a:r>
+            <a:r>
+              <a:rPr lang="en-US" dirty="0"/>
+              <a:t>/ queries.</a:t>
+            </a:r>
+          </a:p>
+        </p:txBody>
+      </p:sp>
+      <p:sp>
+        <p:nvSpPr>
+          <p:cNvPr id="4" name="Slide Number Placeholder 3"/>
+          <p:cNvSpPr>
+            <a:spLocks noGrp="1"/>
+          </p:cNvSpPr>
+          <p:nvPr>
+            <p:ph type="sldNum" sz="quarter" idx="5"/>
+          </p:nvPr>
+        </p:nvSpPr>
+        <p:spPr/>
+        <p:txBody>
+          <a:bodyPr/>
+          <a:lstStyle/>
+          <a:p>
+            <a:fld id="{DF2352D6-35AF-0544-A99E-554CC41E76C4}" type="slidenum">
+              <a:rPr lang="en-US" smtClean="0"/>
+              <a:t>14</a:t>
+            </a:fld>
+            <a:endParaRPr lang="en-US"/>
+          </a:p>
+        </p:txBody>
+      </p:sp>
+    </p:spTree>
+    <p:extLst>
+      <p:ext uri="{BB962C8B-B14F-4D97-AF65-F5344CB8AC3E}">
+        <p14:creationId xmlns:p14="http://schemas.microsoft.com/office/powerpoint/2010/main" val="1729663945"/>
+      </p:ext>
+    </p:extLst>
+  </p:cSld>
+  <p:clrMapOvr>
+    <a:masterClrMapping/>
+  </p:clrMapOvr>
+</p:notes>
+</file>
+
+<file path=ppt/notesSlides/notesSlide14.xml><?xml version="1.0" encoding="utf-8"?>
+<p:notes xmlns:a="http://schemas.openxmlformats.org/drawingml/2006/main" xmlns:r="http://schemas.openxmlformats.org/officeDocument/2006/relationships" xmlns:p="http://schemas.openxmlformats.org/presentationml/2006/main">
+  <p:cSld>
+    <p:spTree>
+      <p:nvGrpSpPr>
+        <p:cNvPr id="1" name=""/>
+        <p:cNvGrpSpPr/>
+        <p:nvPr/>
+      </p:nvGrpSpPr>
+      <p:grpSpPr>
+        <a:xfrm>
+          <a:off x="0" y="0"/>
+          <a:ext cx="0" cy="0"/>
+          <a:chOff x="0" y="0"/>
+          <a:chExt cx="0" cy="0"/>
+        </a:xfrm>
+      </p:grpSpPr>
+      <p:sp>
+        <p:nvSpPr>
+          <p:cNvPr id="2" name="Slide Image Placeholder 1"/>
+          <p:cNvSpPr>
+            <a:spLocks noGrp="1" noRot="1" noChangeAspect="1"/>
+          </p:cNvSpPr>
+          <p:nvPr>
+            <p:ph type="sldImg"/>
+          </p:nvPr>
+        </p:nvSpPr>
+        <p:spPr/>
+      </p:sp>
+      <p:sp>
+        <p:nvSpPr>
+          <p:cNvPr id="3" name="Notes Placeholder 2"/>
+          <p:cNvSpPr>
+            <a:spLocks noGrp="1"/>
+          </p:cNvSpPr>
+          <p:nvPr>
+            <p:ph type="body" idx="1"/>
+          </p:nvPr>
+        </p:nvSpPr>
+        <p:spPr/>
+        <p:txBody>
+          <a:bodyPr/>
+          <a:lstStyle/>
+          <a:p>
+            <a:endParaRPr lang="en-US" dirty="0"/>
+          </a:p>
+        </p:txBody>
+      </p:sp>
+      <p:sp>
+        <p:nvSpPr>
+          <p:cNvPr id="4" name="Slide Number Placeholder 3"/>
+          <p:cNvSpPr>
+            <a:spLocks noGrp="1"/>
+          </p:cNvSpPr>
+          <p:nvPr>
+            <p:ph type="sldNum" sz="quarter" idx="5"/>
+          </p:nvPr>
+        </p:nvSpPr>
+        <p:spPr/>
+        <p:txBody>
+          <a:bodyPr/>
+          <a:lstStyle/>
+          <a:p>
+            <a:fld id="{DF2352D6-35AF-0544-A99E-554CC41E76C4}" type="slidenum">
+              <a:rPr lang="en-US" smtClean="0"/>
+              <a:t>15</a:t>
             </a:fld>
             <a:endParaRPr lang="en-US"/>
           </a:p>
@@ -1697,6 +1878,24 @@
               <a:t>*Include screenshot </a:t>
             </a:r>
           </a:p>
+          <a:p>
+            <a:endParaRPr lang="en-US" dirty="0"/>
+          </a:p>
+          <a:p>
+            <a:endParaRPr lang="en-US" dirty="0"/>
+          </a:p>
+          <a:p>
+            <a:r>
+              <a:rPr lang="en-US" dirty="0"/>
+              <a:t>***Table Names/Columns </a:t>
+            </a:r>
+          </a:p>
+          <a:p>
+            <a:r>
+              <a:rPr lang="en-US" dirty="0"/>
+              <a:t>***</a:t>
+            </a:r>
+          </a:p>
         </p:txBody>
       </p:sp>
       <p:sp>
@@ -2012,18 +2211,7 @@
           <a:bodyPr/>
           <a:lstStyle/>
           <a:p>
-            <a:r>
-              <a:rPr lang="en-US" dirty="0"/>
-              <a:t>*** Provide details on Elephant </a:t>
-            </a:r>
-            <a:r>
-              <a:rPr lang="en-US" dirty="0" err="1"/>
-              <a:t>SQLscreenshots</a:t>
-            </a:r>
-            <a:r>
-              <a:rPr lang="en-US" dirty="0"/>
-              <a:t>/ queries.</a:t>
-            </a:r>
+            <a:endParaRPr lang="en-US" dirty="0"/>
           </a:p>
         </p:txBody>
       </p:sp>
@@ -2053,7 +2241,7 @@
     </p:spTree>
     <p:extLst>
       <p:ext uri="{BB962C8B-B14F-4D97-AF65-F5344CB8AC3E}">
-        <p14:creationId xmlns:p14="http://schemas.microsoft.com/office/powerpoint/2010/main" val="1729663945"/>
+        <p14:creationId xmlns:p14="http://schemas.microsoft.com/office/powerpoint/2010/main" val="3493068767"/>
       </p:ext>
     </p:extLst>
   </p:cSld>
@@ -5471,6 +5659,740 @@
                   <a:srgbClr val="EA5E46"/>
                 </a:solidFill>
               </a:rPr>
+              <a:t>Property types available in NYC</a:t>
+            </a:r>
+          </a:p>
+        </p:txBody>
+      </p:sp>
+      <p:pic>
+        <p:nvPicPr>
+          <p:cNvPr id="2050" name="Picture 2" descr="Image result for air bnb logo">
+            <a:extLst>
+              <a:ext uri="{FF2B5EF4-FFF2-40B4-BE49-F238E27FC236}">
+                <a16:creationId xmlns:a16="http://schemas.microsoft.com/office/drawing/2014/main" id="{A162C291-208B-BE48-BF44-7D5CD7EF6151}"/>
+              </a:ext>
+            </a:extLst>
+          </p:cNvPr>
+          <p:cNvPicPr>
+            <a:picLocks noChangeAspect="1" noChangeArrowheads="1"/>
+          </p:cNvPicPr>
+          <p:nvPr/>
+        </p:nvPicPr>
+        <p:blipFill>
+          <a:blip r:embed="rId3">
+            <a:extLst>
+              <a:ext uri="{28A0092B-C50C-407E-A947-70E740481C1C}">
+                <a14:useLocalDpi xmlns:a14="http://schemas.microsoft.com/office/drawing/2010/main" val="0"/>
+              </a:ext>
+            </a:extLst>
+          </a:blip>
+          <a:srcRect/>
+          <a:stretch>
+            <a:fillRect/>
+          </a:stretch>
+        </p:blipFill>
+        <p:spPr bwMode="auto">
+          <a:xfrm>
+            <a:off x="2080820" y="0"/>
+            <a:ext cx="2189605" cy="2022038"/>
+          </a:xfrm>
+          <a:prstGeom prst="rect">
+            <a:avLst/>
+          </a:prstGeom>
+          <a:noFill/>
+          <a:extLst>
+            <a:ext uri="{909E8E84-426E-40DD-AFC4-6F175D3DCCD1}">
+              <a14:hiddenFill xmlns:a14="http://schemas.microsoft.com/office/drawing/2010/main">
+                <a:solidFill>
+                  <a:srgbClr val="FFFFFF"/>
+                </a:solidFill>
+              </a14:hiddenFill>
+            </a:ext>
+          </a:extLst>
+        </p:spPr>
+      </p:pic>
+      <p:cxnSp>
+        <p:nvCxnSpPr>
+          <p:cNvPr id="6" name="Straight Connector 5">
+            <a:extLst>
+              <a:ext uri="{FF2B5EF4-FFF2-40B4-BE49-F238E27FC236}">
+                <a16:creationId xmlns:a16="http://schemas.microsoft.com/office/drawing/2014/main" id="{7D0926DC-6298-B648-9DF9-0D78D09F9FC8}"/>
+              </a:ext>
+            </a:extLst>
+          </p:cNvPr>
+          <p:cNvCxnSpPr>
+            <a:cxnSpLocks/>
+          </p:cNvCxnSpPr>
+          <p:nvPr/>
+        </p:nvCxnSpPr>
+        <p:spPr>
+          <a:xfrm>
+            <a:off x="2526110" y="1576551"/>
+            <a:ext cx="9518745" cy="1"/>
+          </a:xfrm>
+          <a:prstGeom prst="line">
+            <a:avLst/>
+          </a:prstGeom>
+          <a:ln w="12700">
+            <a:solidFill>
+              <a:srgbClr val="EA5E46"/>
+            </a:solidFill>
+          </a:ln>
+        </p:spPr>
+        <p:style>
+          <a:lnRef idx="1">
+            <a:schemeClr val="accent2"/>
+          </a:lnRef>
+          <a:fillRef idx="0">
+            <a:schemeClr val="accent2"/>
+          </a:fillRef>
+          <a:effectRef idx="0">
+            <a:schemeClr val="accent2"/>
+          </a:effectRef>
+          <a:fontRef idx="minor">
+            <a:schemeClr val="tx1"/>
+          </a:fontRef>
+        </p:style>
+      </p:cxnSp>
+    </p:spTree>
+    <p:extLst>
+      <p:ext uri="{BB962C8B-B14F-4D97-AF65-F5344CB8AC3E}">
+        <p14:creationId xmlns:p14="http://schemas.microsoft.com/office/powerpoint/2010/main" val="3225701336"/>
+      </p:ext>
+    </p:extLst>
+  </p:cSld>
+  <p:clrMapOvr>
+    <a:masterClrMapping/>
+  </p:clrMapOvr>
+</p:sld>
+</file>
+
+<file path=ppt/slides/slide11.xml><?xml version="1.0" encoding="utf-8"?>
+<p:sld xmlns:a="http://schemas.openxmlformats.org/drawingml/2006/main" xmlns:r="http://schemas.openxmlformats.org/officeDocument/2006/relationships" xmlns:p="http://schemas.openxmlformats.org/presentationml/2006/main">
+  <p:cSld>
+    <p:spTree>
+      <p:nvGrpSpPr>
+        <p:cNvPr id="1" name=""/>
+        <p:cNvGrpSpPr/>
+        <p:nvPr/>
+      </p:nvGrpSpPr>
+      <p:grpSpPr>
+        <a:xfrm>
+          <a:off x="0" y="0"/>
+          <a:ext cx="0" cy="0"/>
+          <a:chOff x="0" y="0"/>
+          <a:chExt cx="0" cy="0"/>
+        </a:xfrm>
+      </p:grpSpPr>
+      <p:sp>
+        <p:nvSpPr>
+          <p:cNvPr id="2" name="Title 1">
+            <a:extLst>
+              <a:ext uri="{FF2B5EF4-FFF2-40B4-BE49-F238E27FC236}">
+                <a16:creationId xmlns:a16="http://schemas.microsoft.com/office/drawing/2014/main" id="{59B8B577-5676-3C4B-A107-E41DB331FD85}"/>
+              </a:ext>
+            </a:extLst>
+          </p:cNvPr>
+          <p:cNvSpPr>
+            <a:spLocks noGrp="1"/>
+          </p:cNvSpPr>
+          <p:nvPr>
+            <p:ph type="title"/>
+          </p:nvPr>
+        </p:nvSpPr>
+        <p:spPr>
+          <a:xfrm>
+            <a:off x="4272238" y="588197"/>
+            <a:ext cx="10515600" cy="1325563"/>
+          </a:xfrm>
+        </p:spPr>
+        <p:txBody>
+          <a:bodyPr/>
+          <a:lstStyle/>
+          <a:p>
+            <a:r>
+              <a:rPr lang="en-US" dirty="0">
+                <a:solidFill>
+                  <a:srgbClr val="EA5E46"/>
+                </a:solidFill>
+              </a:rPr>
+              <a:t>NYC </a:t>
+            </a:r>
+            <a:r>
+              <a:rPr lang="en-US" dirty="0" err="1">
+                <a:solidFill>
+                  <a:srgbClr val="EA5E46"/>
+                </a:solidFill>
+              </a:rPr>
+              <a:t>Neighbourhood</a:t>
+            </a:r>
+            <a:r>
+              <a:rPr lang="en-US" dirty="0">
+                <a:solidFill>
+                  <a:srgbClr val="EA5E46"/>
+                </a:solidFill>
+              </a:rPr>
+              <a:t> Ratings </a:t>
+            </a:r>
+          </a:p>
+        </p:txBody>
+      </p:sp>
+      <p:pic>
+        <p:nvPicPr>
+          <p:cNvPr id="2050" name="Picture 2" descr="Image result for air bnb logo">
+            <a:extLst>
+              <a:ext uri="{FF2B5EF4-FFF2-40B4-BE49-F238E27FC236}">
+                <a16:creationId xmlns:a16="http://schemas.microsoft.com/office/drawing/2014/main" id="{A162C291-208B-BE48-BF44-7D5CD7EF6151}"/>
+              </a:ext>
+            </a:extLst>
+          </p:cNvPr>
+          <p:cNvPicPr>
+            <a:picLocks noChangeAspect="1" noChangeArrowheads="1"/>
+          </p:cNvPicPr>
+          <p:nvPr/>
+        </p:nvPicPr>
+        <p:blipFill>
+          <a:blip r:embed="rId3">
+            <a:extLst>
+              <a:ext uri="{28A0092B-C50C-407E-A947-70E740481C1C}">
+                <a14:useLocalDpi xmlns:a14="http://schemas.microsoft.com/office/drawing/2010/main" val="0"/>
+              </a:ext>
+            </a:extLst>
+          </a:blip>
+          <a:srcRect/>
+          <a:stretch>
+            <a:fillRect/>
+          </a:stretch>
+        </p:blipFill>
+        <p:spPr bwMode="auto">
+          <a:xfrm>
+            <a:off x="2080820" y="0"/>
+            <a:ext cx="2189605" cy="2022038"/>
+          </a:xfrm>
+          <a:prstGeom prst="rect">
+            <a:avLst/>
+          </a:prstGeom>
+          <a:noFill/>
+          <a:extLst>
+            <a:ext uri="{909E8E84-426E-40DD-AFC4-6F175D3DCCD1}">
+              <a14:hiddenFill xmlns:a14="http://schemas.microsoft.com/office/drawing/2010/main">
+                <a:solidFill>
+                  <a:srgbClr val="FFFFFF"/>
+                </a:solidFill>
+              </a14:hiddenFill>
+            </a:ext>
+          </a:extLst>
+        </p:spPr>
+      </p:pic>
+      <p:cxnSp>
+        <p:nvCxnSpPr>
+          <p:cNvPr id="6" name="Straight Connector 5">
+            <a:extLst>
+              <a:ext uri="{FF2B5EF4-FFF2-40B4-BE49-F238E27FC236}">
+                <a16:creationId xmlns:a16="http://schemas.microsoft.com/office/drawing/2014/main" id="{7D0926DC-6298-B648-9DF9-0D78D09F9FC8}"/>
+              </a:ext>
+            </a:extLst>
+          </p:cNvPr>
+          <p:cNvCxnSpPr>
+            <a:cxnSpLocks/>
+          </p:cNvCxnSpPr>
+          <p:nvPr/>
+        </p:nvCxnSpPr>
+        <p:spPr>
+          <a:xfrm>
+            <a:off x="2526110" y="1576551"/>
+            <a:ext cx="9518745" cy="1"/>
+          </a:xfrm>
+          <a:prstGeom prst="line">
+            <a:avLst/>
+          </a:prstGeom>
+          <a:ln w="12700">
+            <a:solidFill>
+              <a:srgbClr val="EA5E46"/>
+            </a:solidFill>
+          </a:ln>
+        </p:spPr>
+        <p:style>
+          <a:lnRef idx="1">
+            <a:schemeClr val="accent2"/>
+          </a:lnRef>
+          <a:fillRef idx="0">
+            <a:schemeClr val="accent2"/>
+          </a:fillRef>
+          <a:effectRef idx="0">
+            <a:schemeClr val="accent2"/>
+          </a:effectRef>
+          <a:fontRef idx="minor">
+            <a:schemeClr val="tx1"/>
+          </a:fontRef>
+        </p:style>
+      </p:cxnSp>
+    </p:spTree>
+    <p:extLst>
+      <p:ext uri="{BB962C8B-B14F-4D97-AF65-F5344CB8AC3E}">
+        <p14:creationId xmlns:p14="http://schemas.microsoft.com/office/powerpoint/2010/main" val="493721797"/>
+      </p:ext>
+    </p:extLst>
+  </p:cSld>
+  <p:clrMapOvr>
+    <a:masterClrMapping/>
+  </p:clrMapOvr>
+</p:sld>
+</file>
+
+<file path=ppt/slides/slide12.xml><?xml version="1.0" encoding="utf-8"?>
+<p:sld xmlns:a="http://schemas.openxmlformats.org/drawingml/2006/main" xmlns:r="http://schemas.openxmlformats.org/officeDocument/2006/relationships" xmlns:p="http://schemas.openxmlformats.org/presentationml/2006/main">
+  <p:cSld>
+    <p:spTree>
+      <p:nvGrpSpPr>
+        <p:cNvPr id="1" name=""/>
+        <p:cNvGrpSpPr/>
+        <p:nvPr/>
+      </p:nvGrpSpPr>
+      <p:grpSpPr>
+        <a:xfrm>
+          <a:off x="0" y="0"/>
+          <a:ext cx="0" cy="0"/>
+          <a:chOff x="0" y="0"/>
+          <a:chExt cx="0" cy="0"/>
+        </a:xfrm>
+      </p:grpSpPr>
+      <p:sp>
+        <p:nvSpPr>
+          <p:cNvPr id="2" name="Title 1">
+            <a:extLst>
+              <a:ext uri="{FF2B5EF4-FFF2-40B4-BE49-F238E27FC236}">
+                <a16:creationId xmlns:a16="http://schemas.microsoft.com/office/drawing/2014/main" id="{59B8B577-5676-3C4B-A107-E41DB331FD85}"/>
+              </a:ext>
+            </a:extLst>
+          </p:cNvPr>
+          <p:cNvSpPr>
+            <a:spLocks noGrp="1"/>
+          </p:cNvSpPr>
+          <p:nvPr>
+            <p:ph type="title"/>
+          </p:nvPr>
+        </p:nvSpPr>
+        <p:spPr>
+          <a:xfrm>
+            <a:off x="4272238" y="588197"/>
+            <a:ext cx="10515600" cy="1325563"/>
+          </a:xfrm>
+        </p:spPr>
+        <p:txBody>
+          <a:bodyPr/>
+          <a:lstStyle/>
+          <a:p>
+            <a:r>
+              <a:rPr lang="en-US" dirty="0">
+                <a:solidFill>
+                  <a:srgbClr val="EA5E46"/>
+                </a:solidFill>
+              </a:rPr>
+              <a:t>Pricing of NYC Neighbourhoods</a:t>
+            </a:r>
+          </a:p>
+        </p:txBody>
+      </p:sp>
+      <p:pic>
+        <p:nvPicPr>
+          <p:cNvPr id="2050" name="Picture 2" descr="Image result for air bnb logo">
+            <a:extLst>
+              <a:ext uri="{FF2B5EF4-FFF2-40B4-BE49-F238E27FC236}">
+                <a16:creationId xmlns:a16="http://schemas.microsoft.com/office/drawing/2014/main" id="{A162C291-208B-BE48-BF44-7D5CD7EF6151}"/>
+              </a:ext>
+            </a:extLst>
+          </p:cNvPr>
+          <p:cNvPicPr>
+            <a:picLocks noChangeAspect="1" noChangeArrowheads="1"/>
+          </p:cNvPicPr>
+          <p:nvPr/>
+        </p:nvPicPr>
+        <p:blipFill>
+          <a:blip r:embed="rId3">
+            <a:extLst>
+              <a:ext uri="{28A0092B-C50C-407E-A947-70E740481C1C}">
+                <a14:useLocalDpi xmlns:a14="http://schemas.microsoft.com/office/drawing/2010/main" val="0"/>
+              </a:ext>
+            </a:extLst>
+          </a:blip>
+          <a:srcRect/>
+          <a:stretch>
+            <a:fillRect/>
+          </a:stretch>
+        </p:blipFill>
+        <p:spPr bwMode="auto">
+          <a:xfrm>
+            <a:off x="2080820" y="0"/>
+            <a:ext cx="2189605" cy="2022038"/>
+          </a:xfrm>
+          <a:prstGeom prst="rect">
+            <a:avLst/>
+          </a:prstGeom>
+          <a:noFill/>
+          <a:extLst>
+            <a:ext uri="{909E8E84-426E-40DD-AFC4-6F175D3DCCD1}">
+              <a14:hiddenFill xmlns:a14="http://schemas.microsoft.com/office/drawing/2010/main">
+                <a:solidFill>
+                  <a:srgbClr val="FFFFFF"/>
+                </a:solidFill>
+              </a14:hiddenFill>
+            </a:ext>
+          </a:extLst>
+        </p:spPr>
+      </p:pic>
+      <p:cxnSp>
+        <p:nvCxnSpPr>
+          <p:cNvPr id="6" name="Straight Connector 5">
+            <a:extLst>
+              <a:ext uri="{FF2B5EF4-FFF2-40B4-BE49-F238E27FC236}">
+                <a16:creationId xmlns:a16="http://schemas.microsoft.com/office/drawing/2014/main" id="{7D0926DC-6298-B648-9DF9-0D78D09F9FC8}"/>
+              </a:ext>
+            </a:extLst>
+          </p:cNvPr>
+          <p:cNvCxnSpPr>
+            <a:cxnSpLocks/>
+          </p:cNvCxnSpPr>
+          <p:nvPr/>
+        </p:nvCxnSpPr>
+        <p:spPr>
+          <a:xfrm>
+            <a:off x="2526110" y="1576551"/>
+            <a:ext cx="9518745" cy="1"/>
+          </a:xfrm>
+          <a:prstGeom prst="line">
+            <a:avLst/>
+          </a:prstGeom>
+          <a:ln w="12700">
+            <a:solidFill>
+              <a:srgbClr val="EA5E46"/>
+            </a:solidFill>
+          </a:ln>
+        </p:spPr>
+        <p:style>
+          <a:lnRef idx="1">
+            <a:schemeClr val="accent2"/>
+          </a:lnRef>
+          <a:fillRef idx="0">
+            <a:schemeClr val="accent2"/>
+          </a:fillRef>
+          <a:effectRef idx="0">
+            <a:schemeClr val="accent2"/>
+          </a:effectRef>
+          <a:fontRef idx="minor">
+            <a:schemeClr val="tx1"/>
+          </a:fontRef>
+        </p:style>
+      </p:cxnSp>
+    </p:spTree>
+    <p:extLst>
+      <p:ext uri="{BB962C8B-B14F-4D97-AF65-F5344CB8AC3E}">
+        <p14:creationId xmlns:p14="http://schemas.microsoft.com/office/powerpoint/2010/main" val="4213610689"/>
+      </p:ext>
+    </p:extLst>
+  </p:cSld>
+  <p:clrMapOvr>
+    <a:masterClrMapping/>
+  </p:clrMapOvr>
+</p:sld>
+</file>
+
+<file path=ppt/slides/slide13.xml><?xml version="1.0" encoding="utf-8"?>
+<p:sld xmlns:a="http://schemas.openxmlformats.org/drawingml/2006/main" xmlns:r="http://schemas.openxmlformats.org/officeDocument/2006/relationships" xmlns:p="http://schemas.openxmlformats.org/presentationml/2006/main">
+  <p:cSld>
+    <p:spTree>
+      <p:nvGrpSpPr>
+        <p:cNvPr id="1" name=""/>
+        <p:cNvGrpSpPr/>
+        <p:nvPr/>
+      </p:nvGrpSpPr>
+      <p:grpSpPr>
+        <a:xfrm>
+          <a:off x="0" y="0"/>
+          <a:ext cx="0" cy="0"/>
+          <a:chOff x="0" y="0"/>
+          <a:chExt cx="0" cy="0"/>
+        </a:xfrm>
+      </p:grpSpPr>
+      <p:sp>
+        <p:nvSpPr>
+          <p:cNvPr id="2" name="Title 1">
+            <a:extLst>
+              <a:ext uri="{FF2B5EF4-FFF2-40B4-BE49-F238E27FC236}">
+                <a16:creationId xmlns:a16="http://schemas.microsoft.com/office/drawing/2014/main" id="{59B8B577-5676-3C4B-A107-E41DB331FD85}"/>
+              </a:ext>
+            </a:extLst>
+          </p:cNvPr>
+          <p:cNvSpPr>
+            <a:spLocks noGrp="1"/>
+          </p:cNvSpPr>
+          <p:nvPr>
+            <p:ph type="title"/>
+          </p:nvPr>
+        </p:nvSpPr>
+        <p:spPr>
+          <a:xfrm>
+            <a:off x="4272238" y="588197"/>
+            <a:ext cx="10515600" cy="1325563"/>
+          </a:xfrm>
+        </p:spPr>
+        <p:txBody>
+          <a:bodyPr/>
+          <a:lstStyle/>
+          <a:p>
+            <a:r>
+              <a:rPr lang="en-US" dirty="0">
+                <a:solidFill>
+                  <a:srgbClr val="EA5E46"/>
+                </a:solidFill>
+              </a:rPr>
+              <a:t>App Dashboard Design</a:t>
+            </a:r>
+          </a:p>
+        </p:txBody>
+      </p:sp>
+      <p:pic>
+        <p:nvPicPr>
+          <p:cNvPr id="2050" name="Picture 2" descr="Image result for air bnb logo">
+            <a:extLst>
+              <a:ext uri="{FF2B5EF4-FFF2-40B4-BE49-F238E27FC236}">
+                <a16:creationId xmlns:a16="http://schemas.microsoft.com/office/drawing/2014/main" id="{A162C291-208B-BE48-BF44-7D5CD7EF6151}"/>
+              </a:ext>
+            </a:extLst>
+          </p:cNvPr>
+          <p:cNvPicPr>
+            <a:picLocks noChangeAspect="1" noChangeArrowheads="1"/>
+          </p:cNvPicPr>
+          <p:nvPr/>
+        </p:nvPicPr>
+        <p:blipFill>
+          <a:blip r:embed="rId3">
+            <a:extLst>
+              <a:ext uri="{28A0092B-C50C-407E-A947-70E740481C1C}">
+                <a14:useLocalDpi xmlns:a14="http://schemas.microsoft.com/office/drawing/2010/main" val="0"/>
+              </a:ext>
+            </a:extLst>
+          </a:blip>
+          <a:srcRect/>
+          <a:stretch>
+            <a:fillRect/>
+          </a:stretch>
+        </p:blipFill>
+        <p:spPr bwMode="auto">
+          <a:xfrm>
+            <a:off x="2080820" y="0"/>
+            <a:ext cx="2189605" cy="2022038"/>
+          </a:xfrm>
+          <a:prstGeom prst="rect">
+            <a:avLst/>
+          </a:prstGeom>
+          <a:noFill/>
+          <a:extLst>
+            <a:ext uri="{909E8E84-426E-40DD-AFC4-6F175D3DCCD1}">
+              <a14:hiddenFill xmlns:a14="http://schemas.microsoft.com/office/drawing/2010/main">
+                <a:solidFill>
+                  <a:srgbClr val="FFFFFF"/>
+                </a:solidFill>
+              </a14:hiddenFill>
+            </a:ext>
+          </a:extLst>
+        </p:spPr>
+      </p:pic>
+      <p:cxnSp>
+        <p:nvCxnSpPr>
+          <p:cNvPr id="6" name="Straight Connector 5">
+            <a:extLst>
+              <a:ext uri="{FF2B5EF4-FFF2-40B4-BE49-F238E27FC236}">
+                <a16:creationId xmlns:a16="http://schemas.microsoft.com/office/drawing/2014/main" id="{7D0926DC-6298-B648-9DF9-0D78D09F9FC8}"/>
+              </a:ext>
+            </a:extLst>
+          </p:cNvPr>
+          <p:cNvCxnSpPr>
+            <a:cxnSpLocks/>
+          </p:cNvCxnSpPr>
+          <p:nvPr/>
+        </p:nvCxnSpPr>
+        <p:spPr>
+          <a:xfrm>
+            <a:off x="2526110" y="1576551"/>
+            <a:ext cx="9518745" cy="1"/>
+          </a:xfrm>
+          <a:prstGeom prst="line">
+            <a:avLst/>
+          </a:prstGeom>
+          <a:ln w="12700">
+            <a:solidFill>
+              <a:srgbClr val="EA5E46"/>
+            </a:solidFill>
+          </a:ln>
+        </p:spPr>
+        <p:style>
+          <a:lnRef idx="1">
+            <a:schemeClr val="accent2"/>
+          </a:lnRef>
+          <a:fillRef idx="0">
+            <a:schemeClr val="accent2"/>
+          </a:fillRef>
+          <a:effectRef idx="0">
+            <a:schemeClr val="accent2"/>
+          </a:effectRef>
+          <a:fontRef idx="minor">
+            <a:schemeClr val="tx1"/>
+          </a:fontRef>
+        </p:style>
+      </p:cxnSp>
+      <p:sp>
+        <p:nvSpPr>
+          <p:cNvPr id="3" name="AutoShape 2">
+            <a:extLst>
+              <a:ext uri="{FF2B5EF4-FFF2-40B4-BE49-F238E27FC236}">
+                <a16:creationId xmlns:a16="http://schemas.microsoft.com/office/drawing/2014/main" id="{4A003885-906A-5B4D-B7E6-D590C2605E53}"/>
+              </a:ext>
+            </a:extLst>
+          </p:cNvPr>
+          <p:cNvSpPr>
+            <a:spLocks noChangeAspect="1" noChangeArrowheads="1"/>
+          </p:cNvSpPr>
+          <p:nvPr/>
+        </p:nvSpPr>
+        <p:spPr bwMode="auto">
+          <a:xfrm>
+            <a:off x="5943599" y="3276599"/>
+            <a:ext cx="5339443" cy="5339443"/>
+          </a:xfrm>
+          <a:prstGeom prst="rect">
+            <a:avLst/>
+          </a:prstGeom>
+          <a:noFill/>
+          <a:extLst>
+            <a:ext uri="{909E8E84-426E-40DD-AFC4-6F175D3DCCD1}">
+              <a14:hiddenFill xmlns:a14="http://schemas.microsoft.com/office/drawing/2010/main">
+                <a:solidFill>
+                  <a:srgbClr val="FFFFFF"/>
+                </a:solidFill>
+              </a14:hiddenFill>
+            </a:ext>
+          </a:extLst>
+        </p:spPr>
+        <p:txBody>
+          <a:bodyPr vert="horz" wrap="square" lIns="91440" tIns="45720" rIns="91440" bIns="45720" numCol="1" anchor="t" anchorCtr="0" compatLnSpc="1">
+            <a:prstTxWarp prst="textNoShape">
+              <a:avLst/>
+            </a:prstTxWarp>
+          </a:bodyPr>
+          <a:lstStyle/>
+          <a:p>
+            <a:endParaRPr lang="en-US"/>
+          </a:p>
+        </p:txBody>
+      </p:sp>
+      <p:sp>
+        <p:nvSpPr>
+          <p:cNvPr id="4" name="AutoShape 4">
+            <a:extLst>
+              <a:ext uri="{FF2B5EF4-FFF2-40B4-BE49-F238E27FC236}">
+                <a16:creationId xmlns:a16="http://schemas.microsoft.com/office/drawing/2014/main" id="{8070242B-70C5-BB4A-960A-BE0D676EA5A9}"/>
+              </a:ext>
+            </a:extLst>
+          </p:cNvPr>
+          <p:cNvSpPr>
+            <a:spLocks noChangeAspect="1" noChangeArrowheads="1"/>
+          </p:cNvSpPr>
+          <p:nvPr/>
+        </p:nvSpPr>
+        <p:spPr bwMode="auto">
+          <a:xfrm>
+            <a:off x="5943599" y="3276599"/>
+            <a:ext cx="5012871" cy="5012871"/>
+          </a:xfrm>
+          <a:prstGeom prst="rect">
+            <a:avLst/>
+          </a:prstGeom>
+          <a:noFill/>
+          <a:extLst>
+            <a:ext uri="{909E8E84-426E-40DD-AFC4-6F175D3DCCD1}">
+              <a14:hiddenFill xmlns:a14="http://schemas.microsoft.com/office/drawing/2010/main">
+                <a:solidFill>
+                  <a:srgbClr val="FFFFFF"/>
+                </a:solidFill>
+              </a14:hiddenFill>
+            </a:ext>
+          </a:extLst>
+        </p:spPr>
+        <p:txBody>
+          <a:bodyPr vert="horz" wrap="square" lIns="91440" tIns="45720" rIns="91440" bIns="45720" numCol="1" anchor="t" anchorCtr="0" compatLnSpc="1">
+            <a:prstTxWarp prst="textNoShape">
+              <a:avLst/>
+            </a:prstTxWarp>
+          </a:bodyPr>
+          <a:lstStyle/>
+          <a:p>
+            <a:endParaRPr lang="en-US"/>
+          </a:p>
+        </p:txBody>
+      </p:sp>
+    </p:spTree>
+    <p:extLst>
+      <p:ext uri="{BB962C8B-B14F-4D97-AF65-F5344CB8AC3E}">
+        <p14:creationId xmlns:p14="http://schemas.microsoft.com/office/powerpoint/2010/main" val="1397239896"/>
+      </p:ext>
+    </p:extLst>
+  </p:cSld>
+  <p:clrMapOvr>
+    <a:masterClrMapping/>
+  </p:clrMapOvr>
+</p:sld>
+</file>
+
+<file path=ppt/slides/slide14.xml><?xml version="1.0" encoding="utf-8"?>
+<p:sld xmlns:a="http://schemas.openxmlformats.org/drawingml/2006/main" xmlns:r="http://schemas.openxmlformats.org/officeDocument/2006/relationships" xmlns:p="http://schemas.openxmlformats.org/presentationml/2006/main">
+  <p:cSld>
+    <p:spTree>
+      <p:nvGrpSpPr>
+        <p:cNvPr id="1" name=""/>
+        <p:cNvGrpSpPr/>
+        <p:nvPr/>
+      </p:nvGrpSpPr>
+      <p:grpSpPr>
+        <a:xfrm>
+          <a:off x="0" y="0"/>
+          <a:ext cx="0" cy="0"/>
+          <a:chOff x="0" y="0"/>
+          <a:chExt cx="0" cy="0"/>
+        </a:xfrm>
+      </p:grpSpPr>
+      <p:sp>
+        <p:nvSpPr>
+          <p:cNvPr id="2" name="Title 1">
+            <a:extLst>
+              <a:ext uri="{FF2B5EF4-FFF2-40B4-BE49-F238E27FC236}">
+                <a16:creationId xmlns:a16="http://schemas.microsoft.com/office/drawing/2014/main" id="{59B8B577-5676-3C4B-A107-E41DB331FD85}"/>
+              </a:ext>
+            </a:extLst>
+          </p:cNvPr>
+          <p:cNvSpPr>
+            <a:spLocks noGrp="1"/>
+          </p:cNvSpPr>
+          <p:nvPr>
+            <p:ph type="title"/>
+          </p:nvPr>
+        </p:nvSpPr>
+        <p:spPr>
+          <a:xfrm>
+            <a:off x="4272238" y="588197"/>
+            <a:ext cx="10515600" cy="1325563"/>
+          </a:xfrm>
+        </p:spPr>
+        <p:txBody>
+          <a:bodyPr/>
+          <a:lstStyle/>
+          <a:p>
+            <a:r>
+              <a:rPr lang="en-US" dirty="0">
+                <a:solidFill>
+                  <a:srgbClr val="EA5E46"/>
+                </a:solidFill>
+              </a:rPr>
               <a:t>Coding Approach</a:t>
             </a:r>
           </a:p>
@@ -5579,7 +6501,7 @@
 </p:sld>
 </file>
 
-<file path=ppt/slides/slide11.xml><?xml version="1.0" encoding="utf-8"?>
+<file path=ppt/slides/slide15.xml><?xml version="1.0" encoding="utf-8"?>
 <p:sld xmlns:a="http://schemas.openxmlformats.org/drawingml/2006/main" xmlns:r="http://schemas.openxmlformats.org/officeDocument/2006/relationships" xmlns:p="http://schemas.openxmlformats.org/presentationml/2006/main">
   <p:cSld>
     <p:spTree>
@@ -5628,7 +6550,7 @@
                   <a:srgbClr val="EA5E46"/>
                 </a:solidFill>
               </a:rPr>
-              <a:t>Creating Interactive Visualizations</a:t>
+              <a:t>Next Steps…</a:t>
             </a:r>
           </a:p>
         </p:txBody>
@@ -5723,433 +6645,30 @@
           </a:fontRef>
         </p:style>
       </p:cxnSp>
-    </p:spTree>
-    <p:extLst>
-      <p:ext uri="{BB962C8B-B14F-4D97-AF65-F5344CB8AC3E}">
-        <p14:creationId xmlns:p14="http://schemas.microsoft.com/office/powerpoint/2010/main" val="3225701336"/>
-      </p:ext>
-    </p:extLst>
-  </p:cSld>
-  <p:clrMapOvr>
-    <a:masterClrMapping/>
-  </p:clrMapOvr>
-</p:sld>
-</file>
-
-<file path=ppt/slides/slide12.xml><?xml version="1.0" encoding="utf-8"?>
-<p:sld xmlns:a="http://schemas.openxmlformats.org/drawingml/2006/main" xmlns:r="http://schemas.openxmlformats.org/officeDocument/2006/relationships" xmlns:p="http://schemas.openxmlformats.org/presentationml/2006/main">
-  <p:cSld>
-    <p:spTree>
-      <p:nvGrpSpPr>
-        <p:cNvPr id="1" name=""/>
-        <p:cNvGrpSpPr/>
-        <p:nvPr/>
-      </p:nvGrpSpPr>
-      <p:grpSpPr>
-        <a:xfrm>
-          <a:off x="0" y="0"/>
-          <a:ext cx="0" cy="0"/>
-          <a:chOff x="0" y="0"/>
-          <a:chExt cx="0" cy="0"/>
-        </a:xfrm>
-      </p:grpSpPr>
-      <p:sp>
-        <p:nvSpPr>
-          <p:cNvPr id="2" name="Title 1">
-            <a:extLst>
-              <a:ext uri="{FF2B5EF4-FFF2-40B4-BE49-F238E27FC236}">
-                <a16:creationId xmlns:a16="http://schemas.microsoft.com/office/drawing/2014/main" id="{59B8B577-5676-3C4B-A107-E41DB331FD85}"/>
-              </a:ext>
-            </a:extLst>
-          </p:cNvPr>
-          <p:cNvSpPr>
-            <a:spLocks noGrp="1"/>
-          </p:cNvSpPr>
-          <p:nvPr>
-            <p:ph type="title"/>
-          </p:nvPr>
+      <p:sp>
+        <p:nvSpPr>
+          <p:cNvPr id="4" name="TextBox 3">
+            <a:extLst>
+              <a:ext uri="{FF2B5EF4-FFF2-40B4-BE49-F238E27FC236}">
+                <a16:creationId xmlns:a16="http://schemas.microsoft.com/office/drawing/2014/main" id="{67A13954-A54D-0C44-B403-C1722DD42C61}"/>
+              </a:ext>
+            </a:extLst>
+          </p:cNvPr>
+          <p:cNvSpPr txBox="1"/>
+          <p:nvPr/>
         </p:nvSpPr>
         <p:spPr>
           <a:xfrm>
-            <a:off x="4272238" y="588197"/>
-            <a:ext cx="10515600" cy="1325563"/>
-          </a:xfrm>
-        </p:spPr>
-        <p:txBody>
-          <a:bodyPr/>
-          <a:lstStyle/>
-          <a:p>
-            <a:r>
-              <a:rPr lang="en-US" dirty="0">
-                <a:solidFill>
-                  <a:srgbClr val="EA5E46"/>
-                </a:solidFill>
-              </a:rPr>
-              <a:t>Web Dashboard </a:t>
-            </a:r>
-          </a:p>
-        </p:txBody>
-      </p:sp>
-      <p:pic>
-        <p:nvPicPr>
-          <p:cNvPr id="2050" name="Picture 2" descr="Image result for air bnb logo">
-            <a:extLst>
-              <a:ext uri="{FF2B5EF4-FFF2-40B4-BE49-F238E27FC236}">
-                <a16:creationId xmlns:a16="http://schemas.microsoft.com/office/drawing/2014/main" id="{A162C291-208B-BE48-BF44-7D5CD7EF6151}"/>
-              </a:ext>
-            </a:extLst>
-          </p:cNvPr>
-          <p:cNvPicPr>
-            <a:picLocks noChangeAspect="1" noChangeArrowheads="1"/>
-          </p:cNvPicPr>
-          <p:nvPr/>
-        </p:nvPicPr>
-        <p:blipFill>
-          <a:blip r:embed="rId3">
-            <a:extLst>
-              <a:ext uri="{28A0092B-C50C-407E-A947-70E740481C1C}">
-                <a14:useLocalDpi xmlns:a14="http://schemas.microsoft.com/office/drawing/2010/main" val="0"/>
-              </a:ext>
-            </a:extLst>
-          </a:blip>
-          <a:srcRect/>
-          <a:stretch>
-            <a:fillRect/>
-          </a:stretch>
-        </p:blipFill>
-        <p:spPr bwMode="auto">
-          <a:xfrm>
-            <a:off x="2080820" y="0"/>
-            <a:ext cx="2189605" cy="2022038"/>
+            <a:off x="360947" y="1913760"/>
+            <a:ext cx="11450053" cy="3662541"/>
           </a:xfrm>
           <a:prstGeom prst="rect">
             <a:avLst/>
           </a:prstGeom>
           <a:noFill/>
-          <a:extLst>
-            <a:ext uri="{909E8E84-426E-40DD-AFC4-6F175D3DCCD1}">
-              <a14:hiddenFill xmlns:a14="http://schemas.microsoft.com/office/drawing/2010/main">
-                <a:solidFill>
-                  <a:srgbClr val="FFFFFF"/>
-                </a:solidFill>
-              </a14:hiddenFill>
-            </a:ext>
-          </a:extLst>
         </p:spPr>
-      </p:pic>
-      <p:cxnSp>
-        <p:nvCxnSpPr>
-          <p:cNvPr id="6" name="Straight Connector 5">
-            <a:extLst>
-              <a:ext uri="{FF2B5EF4-FFF2-40B4-BE49-F238E27FC236}">
-                <a16:creationId xmlns:a16="http://schemas.microsoft.com/office/drawing/2014/main" id="{7D0926DC-6298-B648-9DF9-0D78D09F9FC8}"/>
-              </a:ext>
-            </a:extLst>
-          </p:cNvPr>
-          <p:cNvCxnSpPr>
-            <a:cxnSpLocks/>
-          </p:cNvCxnSpPr>
-          <p:nvPr/>
-        </p:nvCxnSpPr>
-        <p:spPr>
-          <a:xfrm>
-            <a:off x="2526110" y="1576551"/>
-            <a:ext cx="9518745" cy="1"/>
-          </a:xfrm>
-          <a:prstGeom prst="line">
-            <a:avLst/>
-          </a:prstGeom>
-          <a:ln w="12700">
-            <a:solidFill>
-              <a:srgbClr val="EA5E46"/>
-            </a:solidFill>
-          </a:ln>
-        </p:spPr>
-        <p:style>
-          <a:lnRef idx="1">
-            <a:schemeClr val="accent2"/>
-          </a:lnRef>
-          <a:fillRef idx="0">
-            <a:schemeClr val="accent2"/>
-          </a:fillRef>
-          <a:effectRef idx="0">
-            <a:schemeClr val="accent2"/>
-          </a:effectRef>
-          <a:fontRef idx="minor">
-            <a:schemeClr val="tx1"/>
-          </a:fontRef>
-        </p:style>
-      </p:cxnSp>
-      <p:sp>
-        <p:nvSpPr>
-          <p:cNvPr id="3" name="AutoShape 2">
-            <a:extLst>
-              <a:ext uri="{FF2B5EF4-FFF2-40B4-BE49-F238E27FC236}">
-                <a16:creationId xmlns:a16="http://schemas.microsoft.com/office/drawing/2014/main" id="{4A003885-906A-5B4D-B7E6-D590C2605E53}"/>
-              </a:ext>
-            </a:extLst>
-          </p:cNvPr>
-          <p:cNvSpPr>
-            <a:spLocks noChangeAspect="1" noChangeArrowheads="1"/>
-          </p:cNvSpPr>
-          <p:nvPr/>
-        </p:nvSpPr>
-        <p:spPr bwMode="auto">
-          <a:xfrm>
-            <a:off x="5943599" y="3276599"/>
-            <a:ext cx="5339443" cy="5339443"/>
-          </a:xfrm>
-          <a:prstGeom prst="rect">
-            <a:avLst/>
-          </a:prstGeom>
-          <a:noFill/>
-          <a:extLst>
-            <a:ext uri="{909E8E84-426E-40DD-AFC4-6F175D3DCCD1}">
-              <a14:hiddenFill xmlns:a14="http://schemas.microsoft.com/office/drawing/2010/main">
-                <a:solidFill>
-                  <a:srgbClr val="FFFFFF"/>
-                </a:solidFill>
-              </a14:hiddenFill>
-            </a:ext>
-          </a:extLst>
-        </p:spPr>
-        <p:txBody>
-          <a:bodyPr vert="horz" wrap="square" lIns="91440" tIns="45720" rIns="91440" bIns="45720" numCol="1" anchor="t" anchorCtr="0" compatLnSpc="1">
-            <a:prstTxWarp prst="textNoShape">
-              <a:avLst/>
-            </a:prstTxWarp>
-          </a:bodyPr>
-          <a:lstStyle/>
-          <a:p>
-            <a:endParaRPr lang="en-US"/>
-          </a:p>
-        </p:txBody>
-      </p:sp>
-      <p:sp>
-        <p:nvSpPr>
-          <p:cNvPr id="4" name="AutoShape 4">
-            <a:extLst>
-              <a:ext uri="{FF2B5EF4-FFF2-40B4-BE49-F238E27FC236}">
-                <a16:creationId xmlns:a16="http://schemas.microsoft.com/office/drawing/2014/main" id="{8070242B-70C5-BB4A-960A-BE0D676EA5A9}"/>
-              </a:ext>
-            </a:extLst>
-          </p:cNvPr>
-          <p:cNvSpPr>
-            <a:spLocks noChangeAspect="1" noChangeArrowheads="1"/>
-          </p:cNvSpPr>
-          <p:nvPr/>
-        </p:nvSpPr>
-        <p:spPr bwMode="auto">
-          <a:xfrm>
-            <a:off x="5943599" y="3276599"/>
-            <a:ext cx="5012871" cy="5012871"/>
-          </a:xfrm>
-          <a:prstGeom prst="rect">
-            <a:avLst/>
-          </a:prstGeom>
-          <a:noFill/>
-          <a:extLst>
-            <a:ext uri="{909E8E84-426E-40DD-AFC4-6F175D3DCCD1}">
-              <a14:hiddenFill xmlns:a14="http://schemas.microsoft.com/office/drawing/2010/main">
-                <a:solidFill>
-                  <a:srgbClr val="FFFFFF"/>
-                </a:solidFill>
-              </a14:hiddenFill>
-            </a:ext>
-          </a:extLst>
-        </p:spPr>
-        <p:txBody>
-          <a:bodyPr vert="horz" wrap="square" lIns="91440" tIns="45720" rIns="91440" bIns="45720" numCol="1" anchor="t" anchorCtr="0" compatLnSpc="1">
-            <a:prstTxWarp prst="textNoShape">
-              <a:avLst/>
-            </a:prstTxWarp>
-          </a:bodyPr>
-          <a:lstStyle/>
-          <a:p>
-            <a:endParaRPr lang="en-US"/>
-          </a:p>
-        </p:txBody>
-      </p:sp>
-    </p:spTree>
-    <p:extLst>
-      <p:ext uri="{BB962C8B-B14F-4D97-AF65-F5344CB8AC3E}">
-        <p14:creationId xmlns:p14="http://schemas.microsoft.com/office/powerpoint/2010/main" val="1397239896"/>
-      </p:ext>
-    </p:extLst>
-  </p:cSld>
-  <p:clrMapOvr>
-    <a:masterClrMapping/>
-  </p:clrMapOvr>
-</p:sld>
-</file>
-
-<file path=ppt/slides/slide13.xml><?xml version="1.0" encoding="utf-8"?>
-<p:sld xmlns:a="http://schemas.openxmlformats.org/drawingml/2006/main" xmlns:r="http://schemas.openxmlformats.org/officeDocument/2006/relationships" xmlns:p="http://schemas.openxmlformats.org/presentationml/2006/main">
-  <p:cSld>
-    <p:spTree>
-      <p:nvGrpSpPr>
-        <p:cNvPr id="1" name=""/>
-        <p:cNvGrpSpPr/>
-        <p:nvPr/>
-      </p:nvGrpSpPr>
-      <p:grpSpPr>
-        <a:xfrm>
-          <a:off x="0" y="0"/>
-          <a:ext cx="0" cy="0"/>
-          <a:chOff x="0" y="0"/>
-          <a:chExt cx="0" cy="0"/>
-        </a:xfrm>
-      </p:grpSpPr>
-      <p:sp>
-        <p:nvSpPr>
-          <p:cNvPr id="2" name="Title 1">
-            <a:extLst>
-              <a:ext uri="{FF2B5EF4-FFF2-40B4-BE49-F238E27FC236}">
-                <a16:creationId xmlns:a16="http://schemas.microsoft.com/office/drawing/2014/main" id="{59B8B577-5676-3C4B-A107-E41DB331FD85}"/>
-              </a:ext>
-            </a:extLst>
-          </p:cNvPr>
-          <p:cNvSpPr>
-            <a:spLocks noGrp="1"/>
-          </p:cNvSpPr>
-          <p:nvPr>
-            <p:ph type="title"/>
-          </p:nvPr>
-        </p:nvSpPr>
-        <p:spPr>
-          <a:xfrm>
-            <a:off x="4272238" y="588197"/>
-            <a:ext cx="10515600" cy="1325563"/>
-          </a:xfrm>
-        </p:spPr>
-        <p:txBody>
-          <a:bodyPr/>
-          <a:lstStyle/>
-          <a:p>
-            <a:r>
-              <a:rPr lang="en-US" dirty="0">
-                <a:solidFill>
-                  <a:srgbClr val="EA5E46"/>
-                </a:solidFill>
-              </a:rPr>
-              <a:t>Next Steps…</a:t>
-            </a:r>
-          </a:p>
-        </p:txBody>
-      </p:sp>
-      <p:pic>
-        <p:nvPicPr>
-          <p:cNvPr id="2050" name="Picture 2" descr="Image result for air bnb logo">
-            <a:extLst>
-              <a:ext uri="{FF2B5EF4-FFF2-40B4-BE49-F238E27FC236}">
-                <a16:creationId xmlns:a16="http://schemas.microsoft.com/office/drawing/2014/main" id="{A162C291-208B-BE48-BF44-7D5CD7EF6151}"/>
-              </a:ext>
-            </a:extLst>
-          </p:cNvPr>
-          <p:cNvPicPr>
-            <a:picLocks noChangeAspect="1" noChangeArrowheads="1"/>
-          </p:cNvPicPr>
-          <p:nvPr/>
-        </p:nvPicPr>
-        <p:blipFill>
-          <a:blip r:embed="rId3">
-            <a:extLst>
-              <a:ext uri="{28A0092B-C50C-407E-A947-70E740481C1C}">
-                <a14:useLocalDpi xmlns:a14="http://schemas.microsoft.com/office/drawing/2010/main" val="0"/>
-              </a:ext>
-            </a:extLst>
-          </a:blip>
-          <a:srcRect/>
-          <a:stretch>
-            <a:fillRect/>
-          </a:stretch>
-        </p:blipFill>
-        <p:spPr bwMode="auto">
-          <a:xfrm>
-            <a:off x="2080820" y="0"/>
-            <a:ext cx="2189605" cy="2022038"/>
-          </a:xfrm>
-          <a:prstGeom prst="rect">
-            <a:avLst/>
-          </a:prstGeom>
-          <a:noFill/>
-          <a:extLst>
-            <a:ext uri="{909E8E84-426E-40DD-AFC4-6F175D3DCCD1}">
-              <a14:hiddenFill xmlns:a14="http://schemas.microsoft.com/office/drawing/2010/main">
-                <a:solidFill>
-                  <a:srgbClr val="FFFFFF"/>
-                </a:solidFill>
-              </a14:hiddenFill>
-            </a:ext>
-          </a:extLst>
-        </p:spPr>
-      </p:pic>
-      <p:cxnSp>
-        <p:nvCxnSpPr>
-          <p:cNvPr id="6" name="Straight Connector 5">
-            <a:extLst>
-              <a:ext uri="{FF2B5EF4-FFF2-40B4-BE49-F238E27FC236}">
-                <a16:creationId xmlns:a16="http://schemas.microsoft.com/office/drawing/2014/main" id="{7D0926DC-6298-B648-9DF9-0D78D09F9FC8}"/>
-              </a:ext>
-            </a:extLst>
-          </p:cNvPr>
-          <p:cNvCxnSpPr>
-            <a:cxnSpLocks/>
-          </p:cNvCxnSpPr>
-          <p:nvPr/>
-        </p:nvCxnSpPr>
-        <p:spPr>
-          <a:xfrm>
-            <a:off x="2526110" y="1576551"/>
-            <a:ext cx="9518745" cy="1"/>
-          </a:xfrm>
-          <a:prstGeom prst="line">
-            <a:avLst/>
-          </a:prstGeom>
-          <a:ln w="12700">
-            <a:solidFill>
-              <a:srgbClr val="EA5E46"/>
-            </a:solidFill>
-          </a:ln>
-        </p:spPr>
-        <p:style>
-          <a:lnRef idx="1">
-            <a:schemeClr val="accent2"/>
-          </a:lnRef>
-          <a:fillRef idx="0">
-            <a:schemeClr val="accent2"/>
-          </a:fillRef>
-          <a:effectRef idx="0">
-            <a:schemeClr val="accent2"/>
-          </a:effectRef>
-          <a:fontRef idx="minor">
-            <a:schemeClr val="tx1"/>
-          </a:fontRef>
-        </p:style>
-      </p:cxnSp>
-      <p:sp>
-        <p:nvSpPr>
-          <p:cNvPr id="3" name="Rectangle 2">
-            <a:extLst>
-              <a:ext uri="{FF2B5EF4-FFF2-40B4-BE49-F238E27FC236}">
-                <a16:creationId xmlns:a16="http://schemas.microsoft.com/office/drawing/2014/main" id="{CDEF6BA6-7EFE-9847-83BD-5AF111B60B33}"/>
-              </a:ext>
-            </a:extLst>
-          </p:cNvPr>
-          <p:cNvSpPr/>
-          <p:nvPr/>
-        </p:nvSpPr>
-        <p:spPr>
-          <a:xfrm>
-            <a:off x="895349" y="2137440"/>
-            <a:ext cx="10744201" cy="2677656"/>
-          </a:xfrm>
-          <a:prstGeom prst="rect">
-            <a:avLst/>
-          </a:prstGeom>
-        </p:spPr>
-        <p:txBody>
-          <a:bodyPr wrap="square">
+        <p:txBody>
+          <a:bodyPr wrap="square" rtlCol="0">
             <a:spAutoFit/>
           </a:bodyPr>
           <a:lstStyle/>
@@ -6159,7 +6678,7 @@
               <a:buChar char="-"/>
             </a:pPr>
             <a:r>
-              <a:rPr lang="en-US" sz="2400" dirty="0">
+              <a:rPr lang="en-US" sz="2800" dirty="0">
                 <a:latin typeface="+mj-lt"/>
               </a:rPr>
               <a:t>A major area of concern for cities worldwide is the effect that expansion of Airbnb has made on the housing market for indigenous residents. </a:t>
@@ -6170,7 +6689,7 @@
               <a:buFontTx/>
               <a:buChar char="-"/>
             </a:pPr>
-            <a:endParaRPr lang="en-US" sz="2400" dirty="0">
+            <a:endParaRPr lang="en-US" sz="2800" dirty="0">
               <a:latin typeface="+mj-lt"/>
             </a:endParaRPr>
           </a:p>
@@ -6180,24 +6699,38 @@
               <a:buChar char="-"/>
             </a:pPr>
             <a:r>
-              <a:rPr lang="en-US" sz="2400" dirty="0">
+              <a:rPr lang="en-US" sz="2800" dirty="0">
                 <a:latin typeface="+mj-lt"/>
               </a:rPr>
               <a:t>Further analysis can help determine if there is a correlation between Airbnb    listings and rental/house prices for NYC neighbourhoods. </a:t>
             </a:r>
           </a:p>
           <a:p>
-            <a:endParaRPr lang="en-US" sz="2400" dirty="0">
+            <a:endParaRPr lang="en-US" sz="2800" dirty="0">
               <a:latin typeface="+mj-lt"/>
             </a:endParaRPr>
           </a:p>
           <a:p>
             <a:r>
-              <a:rPr lang="en-US" sz="2400" dirty="0">
+              <a:rPr lang="en-US" sz="2800" dirty="0">
                 <a:latin typeface="+mj-lt"/>
               </a:rPr>
               <a:t>-   Create a model to predict the average Airbnb prices in New York.</a:t>
             </a:r>
+          </a:p>
+          <a:p>
+            <a:pPr marL="285750" indent="-285750">
+              <a:buFontTx/>
+              <a:buChar char="-"/>
+            </a:pPr>
+            <a:endParaRPr lang="en-US" dirty="0"/>
+          </a:p>
+          <a:p>
+            <a:pPr marL="285750" indent="-285750">
+              <a:buFontTx/>
+              <a:buChar char="-"/>
+            </a:pPr>
+            <a:endParaRPr lang="en-US" dirty="0"/>
           </a:p>
         </p:txBody>
       </p:sp>
@@ -8688,44 +9221,40 @@
             </a:r>
           </a:p>
           <a:p>
+            <a:endParaRPr lang="en-CA" dirty="0">
+              <a:latin typeface="+mj-lt"/>
+            </a:endParaRPr>
+          </a:p>
+          <a:p>
+            <a:pPr marL="285750" indent="-285750">
+              <a:buFont typeface="Arial" panose="020B0604020202020204" pitchFamily="34" charset="0"/>
+              <a:buChar char="•"/>
+            </a:pPr>
+            <a:r>
+              <a:rPr lang="en-CA" dirty="0">
+                <a:latin typeface="+mj-lt"/>
+              </a:rPr>
+              <a:t>Needed to further reduce the size of dataset to meet free uploading requirements to </a:t>
+            </a:r>
+            <a:r>
+              <a:rPr lang="en-CA" dirty="0" err="1">
+                <a:latin typeface="+mj-lt"/>
+              </a:rPr>
+              <a:t>postgres</a:t>
+            </a:r>
+            <a:r>
+              <a:rPr lang="en-CA" dirty="0">
+                <a:latin typeface="+mj-lt"/>
+              </a:rPr>
+              <a:t> SQL. </a:t>
+            </a:r>
+          </a:p>
+          <a:p>
             <a:pPr marL="285750" indent="-285750">
               <a:buFont typeface="Arial" panose="020B0604020202020204" pitchFamily="34" charset="0"/>
               <a:buChar char="•"/>
             </a:pPr>
             <a:endParaRPr lang="en-CA" dirty="0">
-              <a:latin typeface="+mj-lt"/>
-            </a:endParaRPr>
-          </a:p>
-          <a:p>
-            <a:pPr marL="285750" indent="-285750">
-              <a:buFont typeface="Arial" panose="020B0604020202020204" pitchFamily="34" charset="0"/>
-              <a:buChar char="•"/>
-            </a:pPr>
-            <a:r>
-              <a:rPr lang="en-CA" dirty="0">
-                <a:latin typeface="+mj-lt"/>
-              </a:rPr>
-              <a:t>Needed to further reduce the size of dataset to meet free uploading requirements to </a:t>
-            </a:r>
-            <a:r>
-              <a:rPr lang="en-CA" dirty="0" err="1">
-                <a:latin typeface="+mj-lt"/>
-              </a:rPr>
-              <a:t>postgres</a:t>
-            </a:r>
-            <a:r>
-              <a:rPr lang="en-CA" dirty="0">
-                <a:latin typeface="+mj-lt"/>
-              </a:rPr>
-              <a:t> SQL. </a:t>
-            </a:r>
-          </a:p>
-          <a:p>
-            <a:pPr marL="285750" indent="-285750">
-              <a:buFont typeface="Arial" panose="020B0604020202020204" pitchFamily="34" charset="0"/>
-              <a:buChar char="•"/>
-            </a:pPr>
-            <a:endParaRPr lang="en-CA">
               <a:latin typeface="+mj-lt"/>
             </a:endParaRPr>
           </a:p>
@@ -8934,7 +9463,7 @@
               <a:rPr lang="en-US" sz="2400" b="1" dirty="0">
                 <a:latin typeface="+mj-lt"/>
               </a:rPr>
-              <a:t>***listing attributes</a:t>
+              <a:t>***listing </a:t>
             </a:r>
           </a:p>
           <a:p>

</xml_diff>